<commit_message>
added less math ver, updates
</commit_message>
<xml_diff>
--- a/5.Crypto/Cryptology1-Terms-Concepts.pptx
+++ b/5.Crypto/Cryptology1-Terms-Concepts.pptx
@@ -210,7 +210,7 @@
           <a:p>
             <a:fld id="{4C31B5AF-BD17-4FC7-A5D1-691F752A28C4}" type="datetimeFigureOut">
               <a:rPr lang="en-US" smtClean="0"/>
-              <a:t>2/3/2019</a:t>
+              <a:t>11/25/2020</a:t>
             </a:fld>
             <a:endParaRPr lang="en-US"/>
           </a:p>
@@ -753,12 +753,6 @@
             <a:endParaRPr lang="en-US" dirty="0"/>
           </a:p>
           <a:p>
-            <a:endParaRPr lang="en-US" dirty="0"/>
-          </a:p>
-          <a:p>
-            <a:endParaRPr lang="en-US" dirty="0"/>
-          </a:p>
-          <a:p>
             <a:r>
               <a:rPr lang="en-US" dirty="0"/>
               <a:t>Asymmetric encryption has the advantage that it can transfer data securely without having to pass the key to the other party.  Assume Alice creates a public/private key pair and posts the public key in a trusted location that Bob can access.  If Bob encrypts data with Alice’s public key, it can only be decrypted with Alice’s private key.  If Alice has kept her private key secret, then the message can be transmitted securely.</a:t>
@@ -986,7 +980,7 @@
           <a:p>
             <a:r>
               <a:rPr lang="en-US" dirty="0"/>
-              <a:t>An algorithm that has had years of examination by the world cryptanalyst community looking for weaknesses is probably secure.  It an algorithm is invented by one or two people, even talented cryptographers, it is likely that an undiscovered subtle weakness exists.  Once the algorithm is available or has been reverse engineered, those subtle weaknesses will be quickly discovered.</a:t>
+              <a:t>An algorithm that has had years of examination by the world cryptanalyst community looking for weaknesses is probably secure.  If an algorithm is invented by one or two people, even talented cryptographers, it is likely that an undiscovered subtle weakness exists.  Once the algorithm is available or has been reverse engineered, those subtle weaknesses will be quickly discovered.</a:t>
             </a:r>
           </a:p>
         </p:txBody>
@@ -1966,7 +1960,7 @@
           <a:p>
             <a:fld id="{0126CD60-82F3-4BCE-A9AA-251EA7F5E926}" type="datetimeFigureOut">
               <a:rPr lang="en-US" smtClean="0"/>
-              <a:t>2/3/2019</a:t>
+              <a:t>11/25/2020</a:t>
             </a:fld>
             <a:endParaRPr lang="en-US"/>
           </a:p>
@@ -2164,7 +2158,7 @@
           <a:p>
             <a:fld id="{0126CD60-82F3-4BCE-A9AA-251EA7F5E926}" type="datetimeFigureOut">
               <a:rPr lang="en-US" smtClean="0"/>
-              <a:t>2/3/2019</a:t>
+              <a:t>11/25/2020</a:t>
             </a:fld>
             <a:endParaRPr lang="en-US"/>
           </a:p>
@@ -2372,7 +2366,7 @@
           <a:p>
             <a:fld id="{0126CD60-82F3-4BCE-A9AA-251EA7F5E926}" type="datetimeFigureOut">
               <a:rPr lang="en-US" smtClean="0"/>
-              <a:t>2/3/2019</a:t>
+              <a:t>11/25/2020</a:t>
             </a:fld>
             <a:endParaRPr lang="en-US"/>
           </a:p>
@@ -2570,7 +2564,7 @@
           <a:p>
             <a:fld id="{0126CD60-82F3-4BCE-A9AA-251EA7F5E926}" type="datetimeFigureOut">
               <a:rPr lang="en-US" smtClean="0"/>
-              <a:t>2/3/2019</a:t>
+              <a:t>11/25/2020</a:t>
             </a:fld>
             <a:endParaRPr lang="en-US"/>
           </a:p>
@@ -2845,7 +2839,7 @@
           <a:p>
             <a:fld id="{0126CD60-82F3-4BCE-A9AA-251EA7F5E926}" type="datetimeFigureOut">
               <a:rPr lang="en-US" smtClean="0"/>
-              <a:t>2/3/2019</a:t>
+              <a:t>11/25/2020</a:t>
             </a:fld>
             <a:endParaRPr lang="en-US"/>
           </a:p>
@@ -3110,7 +3104,7 @@
           <a:p>
             <a:fld id="{0126CD60-82F3-4BCE-A9AA-251EA7F5E926}" type="datetimeFigureOut">
               <a:rPr lang="en-US" smtClean="0"/>
-              <a:t>2/3/2019</a:t>
+              <a:t>11/25/2020</a:t>
             </a:fld>
             <a:endParaRPr lang="en-US"/>
           </a:p>
@@ -3522,7 +3516,7 @@
           <a:p>
             <a:fld id="{0126CD60-82F3-4BCE-A9AA-251EA7F5E926}" type="datetimeFigureOut">
               <a:rPr lang="en-US" smtClean="0"/>
-              <a:t>2/3/2019</a:t>
+              <a:t>11/25/2020</a:t>
             </a:fld>
             <a:endParaRPr lang="en-US"/>
           </a:p>
@@ -3663,7 +3657,7 @@
           <a:p>
             <a:fld id="{0126CD60-82F3-4BCE-A9AA-251EA7F5E926}" type="datetimeFigureOut">
               <a:rPr lang="en-US" smtClean="0"/>
-              <a:t>2/3/2019</a:t>
+              <a:t>11/25/2020</a:t>
             </a:fld>
             <a:endParaRPr lang="en-US"/>
           </a:p>
@@ -3776,7 +3770,7 @@
           <a:p>
             <a:fld id="{0126CD60-82F3-4BCE-A9AA-251EA7F5E926}" type="datetimeFigureOut">
               <a:rPr lang="en-US" smtClean="0"/>
-              <a:t>2/3/2019</a:t>
+              <a:t>11/25/2020</a:t>
             </a:fld>
             <a:endParaRPr lang="en-US"/>
           </a:p>
@@ -4087,7 +4081,7 @@
           <a:p>
             <a:fld id="{0126CD60-82F3-4BCE-A9AA-251EA7F5E926}" type="datetimeFigureOut">
               <a:rPr lang="en-US" smtClean="0"/>
-              <a:t>2/3/2019</a:t>
+              <a:t>11/25/2020</a:t>
             </a:fld>
             <a:endParaRPr lang="en-US"/>
           </a:p>
@@ -4375,7 +4369,7 @@
           <a:p>
             <a:fld id="{0126CD60-82F3-4BCE-A9AA-251EA7F5E926}" type="datetimeFigureOut">
               <a:rPr lang="en-US" smtClean="0"/>
-              <a:t>2/3/2019</a:t>
+              <a:t>11/25/2020</a:t>
             </a:fld>
             <a:endParaRPr lang="en-US"/>
           </a:p>
@@ -4616,7 +4610,7 @@
           <a:p>
             <a:fld id="{0126CD60-82F3-4BCE-A9AA-251EA7F5E926}" type="datetimeFigureOut">
               <a:rPr lang="en-US" smtClean="0"/>
-              <a:t>2/3/2019</a:t>
+              <a:t>11/25/2020</a:t>
             </a:fld>
             <a:endParaRPr lang="en-US"/>
           </a:p>

</xml_diff>